<commit_message>
adjustment to the template to manage plot position in R
</commit_message>
<xml_diff>
--- a/inst/resources/templates/pptx_template.pptx
+++ b/inst/resources/templates/pptx_template.pptx
@@ -375,7 +375,7 @@
             <a:fld id="{D2AFCC29-5969-455F-A66F-011619E11FF2}" type="datetimeFigureOut">
               <a:rPr lang="en-CH" smtClean="0"/>
               <a:pPr/>
-              <a:t>07/12/2021</a:t>
+              <a:t>09/15/2022</a:t>
             </a:fld>
             <a:endParaRPr lang="en-CH" dirty="0"/>
           </a:p>
@@ -498,86 +498,6 @@
           </a:p>
         </p:txBody>
       </p:sp>
-      <p:pic>
-        <p:nvPicPr>
-          <p:cNvPr id="7" name="Graphic 6">
-            <a:extLst>
-              <a:ext uri="{FF2B5EF4-FFF2-40B4-BE49-F238E27FC236}">
-                <a16:creationId xmlns:a16="http://schemas.microsoft.com/office/drawing/2014/main" id="{267AD4FC-8FE5-4537-BD29-DD9A187FCF09}"/>
-              </a:ext>
-            </a:extLst>
-          </p:cNvPr>
-          <p:cNvPicPr>
-            <a:picLocks noChangeAspect="1"/>
-          </p:cNvPicPr>
-          <p:nvPr userDrawn="1"/>
-        </p:nvPicPr>
-        <p:blipFill>
-          <a:blip r:embed="rId2">
-            <a:extLst>
-              <a:ext uri="{28A0092B-C50C-407E-A947-70E740481C1C}">
-                <a14:useLocalDpi xmlns:a14="http://schemas.microsoft.com/office/drawing/2010/main" val="0"/>
-              </a:ext>
-              <a:ext uri="{96DAC541-7B7A-43D3-8B79-37D633B846F1}">
-                <asvg:svgBlip xmlns:asvg="http://schemas.microsoft.com/office/drawing/2016/SVG/main" r:embed="rId3"/>
-              </a:ext>
-            </a:extLst>
-          </a:blip>
-          <a:stretch>
-            <a:fillRect/>
-          </a:stretch>
-        </p:blipFill>
-        <p:spPr>
-          <a:xfrm>
-            <a:off x="10046899" y="6217920"/>
-            <a:ext cx="1913453" cy="457200"/>
-          </a:xfrm>
-          <a:prstGeom prst="rect">
-            <a:avLst/>
-          </a:prstGeom>
-        </p:spPr>
-      </p:pic>
-      <p:cxnSp>
-        <p:nvCxnSpPr>
-          <p:cNvPr id="8" name="Straight Connector 7">
-            <a:extLst>
-              <a:ext uri="{FF2B5EF4-FFF2-40B4-BE49-F238E27FC236}">
-                <a16:creationId xmlns:a16="http://schemas.microsoft.com/office/drawing/2014/main" id="{F70CCAED-4C37-44F6-B41D-716E07C1433C}"/>
-              </a:ext>
-            </a:extLst>
-          </p:cNvPr>
-          <p:cNvCxnSpPr/>
-          <p:nvPr userDrawn="1"/>
-        </p:nvCxnSpPr>
-        <p:spPr>
-          <a:xfrm>
-            <a:off x="-1524" y="6035040"/>
-            <a:ext cx="12192000" cy="0"/>
-          </a:xfrm>
-          <a:prstGeom prst="line">
-            <a:avLst/>
-          </a:prstGeom>
-          <a:ln w="9525">
-            <a:solidFill>
-              <a:srgbClr val="CCCCCC"/>
-            </a:solidFill>
-          </a:ln>
-        </p:spPr>
-        <p:style>
-          <a:lnRef idx="1">
-            <a:schemeClr val="accent1"/>
-          </a:lnRef>
-          <a:fillRef idx="0">
-            <a:schemeClr val="accent1"/>
-          </a:fillRef>
-          <a:effectRef idx="0">
-            <a:schemeClr val="accent1"/>
-          </a:effectRef>
-          <a:fontRef idx="minor">
-            <a:schemeClr val="tx1"/>
-          </a:fontRef>
-        </p:style>
-      </p:cxnSp>
     </p:spTree>
     <p:extLst>
       <p:ext uri="{BB962C8B-B14F-4D97-AF65-F5344CB8AC3E}">
@@ -1046,86 +966,6 @@
           </a:p>
         </p:txBody>
       </p:sp>
-      <p:pic>
-        <p:nvPicPr>
-          <p:cNvPr id="8" name="Graphic 7">
-            <a:extLst>
-              <a:ext uri="{FF2B5EF4-FFF2-40B4-BE49-F238E27FC236}">
-                <a16:creationId xmlns:a16="http://schemas.microsoft.com/office/drawing/2014/main" id="{4394712C-70EA-4514-9041-7EC012A8F0F4}"/>
-              </a:ext>
-            </a:extLst>
-          </p:cNvPr>
-          <p:cNvPicPr>
-            <a:picLocks noChangeAspect="1"/>
-          </p:cNvPicPr>
-          <p:nvPr userDrawn="1"/>
-        </p:nvPicPr>
-        <p:blipFill>
-          <a:blip r:embed="rId2">
-            <a:extLst>
-              <a:ext uri="{28A0092B-C50C-407E-A947-70E740481C1C}">
-                <a14:useLocalDpi xmlns:a14="http://schemas.microsoft.com/office/drawing/2010/main" val="0"/>
-              </a:ext>
-              <a:ext uri="{96DAC541-7B7A-43D3-8B79-37D633B846F1}">
-                <asvg:svgBlip xmlns:asvg="http://schemas.microsoft.com/office/drawing/2016/SVG/main" r:embed="rId3"/>
-              </a:ext>
-            </a:extLst>
-          </a:blip>
-          <a:stretch>
-            <a:fillRect/>
-          </a:stretch>
-        </p:blipFill>
-        <p:spPr>
-          <a:xfrm>
-            <a:off x="10046899" y="6217920"/>
-            <a:ext cx="1913453" cy="457200"/>
-          </a:xfrm>
-          <a:prstGeom prst="rect">
-            <a:avLst/>
-          </a:prstGeom>
-        </p:spPr>
-      </p:pic>
-      <p:cxnSp>
-        <p:nvCxnSpPr>
-          <p:cNvPr id="9" name="Straight Connector 8">
-            <a:extLst>
-              <a:ext uri="{FF2B5EF4-FFF2-40B4-BE49-F238E27FC236}">
-                <a16:creationId xmlns:a16="http://schemas.microsoft.com/office/drawing/2014/main" id="{718E5999-7C25-4409-9DD2-695E44BCCC86}"/>
-              </a:ext>
-            </a:extLst>
-          </p:cNvPr>
-          <p:cNvCxnSpPr/>
-          <p:nvPr userDrawn="1"/>
-        </p:nvCxnSpPr>
-        <p:spPr>
-          <a:xfrm>
-            <a:off x="-1524" y="6035040"/>
-            <a:ext cx="12192000" cy="0"/>
-          </a:xfrm>
-          <a:prstGeom prst="line">
-            <a:avLst/>
-          </a:prstGeom>
-          <a:ln w="9525">
-            <a:solidFill>
-              <a:srgbClr val="CCCCCC"/>
-            </a:solidFill>
-          </a:ln>
-        </p:spPr>
-        <p:style>
-          <a:lnRef idx="1">
-            <a:schemeClr val="accent1"/>
-          </a:lnRef>
-          <a:fillRef idx="0">
-            <a:schemeClr val="accent1"/>
-          </a:fillRef>
-          <a:effectRef idx="0">
-            <a:schemeClr val="accent1"/>
-          </a:effectRef>
-          <a:fontRef idx="minor">
-            <a:schemeClr val="tx1"/>
-          </a:fontRef>
-        </p:style>
-      </p:cxnSp>
     </p:spTree>
     <p:extLst>
       <p:ext uri="{BB962C8B-B14F-4D97-AF65-F5344CB8AC3E}">
@@ -1458,86 +1298,6 @@
           </a:p>
         </p:txBody>
       </p:sp>
-      <p:pic>
-        <p:nvPicPr>
-          <p:cNvPr id="10" name="Graphic 9">
-            <a:extLst>
-              <a:ext uri="{FF2B5EF4-FFF2-40B4-BE49-F238E27FC236}">
-                <a16:creationId xmlns:a16="http://schemas.microsoft.com/office/drawing/2014/main" id="{968BFA71-6577-4160-A438-02B5E04CD400}"/>
-              </a:ext>
-            </a:extLst>
-          </p:cNvPr>
-          <p:cNvPicPr>
-            <a:picLocks noChangeAspect="1"/>
-          </p:cNvPicPr>
-          <p:nvPr userDrawn="1"/>
-        </p:nvPicPr>
-        <p:blipFill>
-          <a:blip r:embed="rId2">
-            <a:extLst>
-              <a:ext uri="{28A0092B-C50C-407E-A947-70E740481C1C}">
-                <a14:useLocalDpi xmlns:a14="http://schemas.microsoft.com/office/drawing/2010/main" val="0"/>
-              </a:ext>
-              <a:ext uri="{96DAC541-7B7A-43D3-8B79-37D633B846F1}">
-                <asvg:svgBlip xmlns:asvg="http://schemas.microsoft.com/office/drawing/2016/SVG/main" r:embed="rId3"/>
-              </a:ext>
-            </a:extLst>
-          </a:blip>
-          <a:stretch>
-            <a:fillRect/>
-          </a:stretch>
-        </p:blipFill>
-        <p:spPr>
-          <a:xfrm>
-            <a:off x="10046899" y="6217920"/>
-            <a:ext cx="1913453" cy="457200"/>
-          </a:xfrm>
-          <a:prstGeom prst="rect">
-            <a:avLst/>
-          </a:prstGeom>
-        </p:spPr>
-      </p:pic>
-      <p:cxnSp>
-        <p:nvCxnSpPr>
-          <p:cNvPr id="11" name="Straight Connector 10">
-            <a:extLst>
-              <a:ext uri="{FF2B5EF4-FFF2-40B4-BE49-F238E27FC236}">
-                <a16:creationId xmlns:a16="http://schemas.microsoft.com/office/drawing/2014/main" id="{CD20CBF6-A941-4AC0-A717-AFD71AAEA543}"/>
-              </a:ext>
-            </a:extLst>
-          </p:cNvPr>
-          <p:cNvCxnSpPr/>
-          <p:nvPr userDrawn="1"/>
-        </p:nvCxnSpPr>
-        <p:spPr>
-          <a:xfrm>
-            <a:off x="-1524" y="6035040"/>
-            <a:ext cx="12192000" cy="0"/>
-          </a:xfrm>
-          <a:prstGeom prst="line">
-            <a:avLst/>
-          </a:prstGeom>
-          <a:ln w="9525">
-            <a:solidFill>
-              <a:srgbClr val="CCCCCC"/>
-            </a:solidFill>
-          </a:ln>
-        </p:spPr>
-        <p:style>
-          <a:lnRef idx="1">
-            <a:schemeClr val="accent1"/>
-          </a:lnRef>
-          <a:fillRef idx="0">
-            <a:schemeClr val="accent1"/>
-          </a:fillRef>
-          <a:effectRef idx="0">
-            <a:schemeClr val="accent1"/>
-          </a:effectRef>
-          <a:fontRef idx="minor">
-            <a:schemeClr val="tx1"/>
-          </a:fontRef>
-        </p:style>
-      </p:cxnSp>
     </p:spTree>
     <p:extLst>
       <p:ext uri="{BB962C8B-B14F-4D97-AF65-F5344CB8AC3E}">
@@ -1597,86 +1357,6 @@
           </a:p>
         </p:txBody>
       </p:sp>
-      <p:pic>
-        <p:nvPicPr>
-          <p:cNvPr id="6" name="Graphic 5">
-            <a:extLst>
-              <a:ext uri="{FF2B5EF4-FFF2-40B4-BE49-F238E27FC236}">
-                <a16:creationId xmlns:a16="http://schemas.microsoft.com/office/drawing/2014/main" id="{FA349EE3-D891-416B-9BEB-0A0DA48DF4DA}"/>
-              </a:ext>
-            </a:extLst>
-          </p:cNvPr>
-          <p:cNvPicPr>
-            <a:picLocks noChangeAspect="1"/>
-          </p:cNvPicPr>
-          <p:nvPr userDrawn="1"/>
-        </p:nvPicPr>
-        <p:blipFill>
-          <a:blip r:embed="rId2">
-            <a:extLst>
-              <a:ext uri="{28A0092B-C50C-407E-A947-70E740481C1C}">
-                <a14:useLocalDpi xmlns:a14="http://schemas.microsoft.com/office/drawing/2010/main" val="0"/>
-              </a:ext>
-              <a:ext uri="{96DAC541-7B7A-43D3-8B79-37D633B846F1}">
-                <asvg:svgBlip xmlns:asvg="http://schemas.microsoft.com/office/drawing/2016/SVG/main" r:embed="rId3"/>
-              </a:ext>
-            </a:extLst>
-          </a:blip>
-          <a:stretch>
-            <a:fillRect/>
-          </a:stretch>
-        </p:blipFill>
-        <p:spPr>
-          <a:xfrm>
-            <a:off x="10046899" y="6217920"/>
-            <a:ext cx="1913453" cy="457200"/>
-          </a:xfrm>
-          <a:prstGeom prst="rect">
-            <a:avLst/>
-          </a:prstGeom>
-        </p:spPr>
-      </p:pic>
-      <p:cxnSp>
-        <p:nvCxnSpPr>
-          <p:cNvPr id="7" name="Straight Connector 6">
-            <a:extLst>
-              <a:ext uri="{FF2B5EF4-FFF2-40B4-BE49-F238E27FC236}">
-                <a16:creationId xmlns:a16="http://schemas.microsoft.com/office/drawing/2014/main" id="{BF72AC81-1BB6-4349-92F6-6FC978536C56}"/>
-              </a:ext>
-            </a:extLst>
-          </p:cNvPr>
-          <p:cNvCxnSpPr/>
-          <p:nvPr userDrawn="1"/>
-        </p:nvCxnSpPr>
-        <p:spPr>
-          <a:xfrm>
-            <a:off x="-1524" y="6035040"/>
-            <a:ext cx="12192000" cy="0"/>
-          </a:xfrm>
-          <a:prstGeom prst="line">
-            <a:avLst/>
-          </a:prstGeom>
-          <a:ln w="9525">
-            <a:solidFill>
-              <a:srgbClr val="CCCCCC"/>
-            </a:solidFill>
-          </a:ln>
-        </p:spPr>
-        <p:style>
-          <a:lnRef idx="1">
-            <a:schemeClr val="accent1"/>
-          </a:lnRef>
-          <a:fillRef idx="0">
-            <a:schemeClr val="accent1"/>
-          </a:fillRef>
-          <a:effectRef idx="0">
-            <a:schemeClr val="accent1"/>
-          </a:effectRef>
-          <a:fontRef idx="minor">
-            <a:schemeClr val="tx1"/>
-          </a:fontRef>
-        </p:style>
-      </p:cxnSp>
     </p:spTree>
     <p:extLst>
       <p:ext uri="{BB962C8B-B14F-4D97-AF65-F5344CB8AC3E}">
@@ -1855,7 +1535,7 @@
           <a:p>
             <a:fld id="{0B674421-677E-4B66-A2DA-A5AC43FD4FB9}" type="datetimeFigureOut">
               <a:rPr lang="en-CH" smtClean="0"/>
-              <a:t>07/12/2021</a:t>
+              <a:t>09/15/2022</a:t>
             </a:fld>
             <a:endParaRPr lang="en-CH"/>
           </a:p>
@@ -2089,7 +1769,7 @@
           <a:p>
             <a:fld id="{0B674421-677E-4B66-A2DA-A5AC43FD4FB9}" type="datetimeFigureOut">
               <a:rPr lang="en-CH" smtClean="0"/>
-              <a:t>07/12/2021</a:t>
+              <a:t>09/15/2022</a:t>
             </a:fld>
             <a:endParaRPr lang="en-CH"/>
           </a:p>
@@ -2307,6 +1987,86 @@
           </a:p>
         </p:txBody>
       </p:sp>
+      <p:pic>
+        <p:nvPicPr>
+          <p:cNvPr id="4" name="Graphic 3">
+            <a:extLst>
+              <a:ext uri="{FF2B5EF4-FFF2-40B4-BE49-F238E27FC236}">
+                <a16:creationId xmlns:a16="http://schemas.microsoft.com/office/drawing/2014/main" id="{28CE3A90-11C1-4290-8A18-B460A5CC1023}"/>
+              </a:ext>
+            </a:extLst>
+          </p:cNvPr>
+          <p:cNvPicPr>
+            <a:picLocks noChangeAspect="1"/>
+          </p:cNvPicPr>
+          <p:nvPr userDrawn="1"/>
+        </p:nvPicPr>
+        <p:blipFill>
+          <a:blip r:embed="rId11">
+            <a:extLst>
+              <a:ext uri="{28A0092B-C50C-407E-A947-70E740481C1C}">
+                <a14:useLocalDpi xmlns:a14="http://schemas.microsoft.com/office/drawing/2010/main" val="0"/>
+              </a:ext>
+              <a:ext uri="{96DAC541-7B7A-43D3-8B79-37D633B846F1}">
+                <asvg:svgBlip xmlns:asvg="http://schemas.microsoft.com/office/drawing/2016/SVG/main" r:embed="rId12"/>
+              </a:ext>
+            </a:extLst>
+          </a:blip>
+          <a:stretch>
+            <a:fillRect/>
+          </a:stretch>
+        </p:blipFill>
+        <p:spPr>
+          <a:xfrm>
+            <a:off x="10046899" y="6217920"/>
+            <a:ext cx="1913453" cy="457200"/>
+          </a:xfrm>
+          <a:prstGeom prst="rect">
+            <a:avLst/>
+          </a:prstGeom>
+        </p:spPr>
+      </p:pic>
+      <p:cxnSp>
+        <p:nvCxnSpPr>
+          <p:cNvPr id="5" name="Straight Connector 4">
+            <a:extLst>
+              <a:ext uri="{FF2B5EF4-FFF2-40B4-BE49-F238E27FC236}">
+                <a16:creationId xmlns:a16="http://schemas.microsoft.com/office/drawing/2014/main" id="{5E2A0459-A2BC-4EE0-86A0-58CC0AA8D65E}"/>
+              </a:ext>
+            </a:extLst>
+          </p:cNvPr>
+          <p:cNvCxnSpPr/>
+          <p:nvPr userDrawn="1"/>
+        </p:nvCxnSpPr>
+        <p:spPr>
+          <a:xfrm>
+            <a:off x="-1524" y="6035040"/>
+            <a:ext cx="12192000" cy="0"/>
+          </a:xfrm>
+          <a:prstGeom prst="line">
+            <a:avLst/>
+          </a:prstGeom>
+          <a:ln w="9525">
+            <a:solidFill>
+              <a:srgbClr val="CCCCCC"/>
+            </a:solidFill>
+          </a:ln>
+        </p:spPr>
+        <p:style>
+          <a:lnRef idx="1">
+            <a:schemeClr val="accent1"/>
+          </a:lnRef>
+          <a:fillRef idx="0">
+            <a:schemeClr val="accent1"/>
+          </a:fillRef>
+          <a:effectRef idx="0">
+            <a:schemeClr val="accent1"/>
+          </a:effectRef>
+          <a:fontRef idx="minor">
+            <a:schemeClr val="tx1"/>
+          </a:fontRef>
+        </p:style>
+      </p:cxnSp>
     </p:spTree>
     <p:extLst>
       <p:ext uri="{BB962C8B-B14F-4D97-AF65-F5344CB8AC3E}">

</xml_diff>

<commit_message>
add content with caption layout
</commit_message>
<xml_diff>
--- a/inst/resources/templates/pptx_template.pptx
+++ b/inst/resources/templates/pptx_template.pptx
@@ -375,7 +375,7 @@
             <a:fld id="{D2AFCC29-5969-455F-A66F-011619E11FF2}" type="datetimeFigureOut">
               <a:rPr lang="en-CH" smtClean="0"/>
               <a:pPr/>
-              <a:t>09/15/2022</a:t>
+              <a:t>09/16/2022</a:t>
             </a:fld>
             <a:endParaRPr lang="en-CH" dirty="0"/>
           </a:p>
@@ -385,6 +385,240 @@
     <p:extLst>
       <p:ext uri="{BB962C8B-B14F-4D97-AF65-F5344CB8AC3E}">
         <p14:creationId xmlns:p14="http://schemas.microsoft.com/office/powerpoint/2010/main" val="4285829196"/>
+      </p:ext>
+    </p:extLst>
+  </p:cSld>
+  <p:clrMapOvr>
+    <a:masterClrMapping/>
+  </p:clrMapOvr>
+</p:sldLayout>
+</file>
+
+<file path=ppt/slideLayouts/slideLayout10.xml><?xml version="1.0" encoding="utf-8"?>
+<p:sldLayout xmlns:a="http://schemas.openxmlformats.org/drawingml/2006/main" xmlns:r="http://schemas.openxmlformats.org/officeDocument/2006/relationships" xmlns:p="http://schemas.openxmlformats.org/presentationml/2006/main" type="vertTitleAndTx" preserve="1">
+  <p:cSld name="Vertical Title and Text">
+    <p:spTree>
+      <p:nvGrpSpPr>
+        <p:cNvPr id="1" name=""/>
+        <p:cNvGrpSpPr/>
+        <p:nvPr/>
+      </p:nvGrpSpPr>
+      <p:grpSpPr>
+        <a:xfrm>
+          <a:off x="0" y="0"/>
+          <a:ext cx="0" cy="0"/>
+          <a:chOff x="0" y="0"/>
+          <a:chExt cx="0" cy="0"/>
+        </a:xfrm>
+      </p:grpSpPr>
+      <p:sp>
+        <p:nvSpPr>
+          <p:cNvPr id="2" name="Vertical Title 1">
+            <a:extLst>
+              <a:ext uri="{FF2B5EF4-FFF2-40B4-BE49-F238E27FC236}">
+                <a16:creationId xmlns:a16="http://schemas.microsoft.com/office/drawing/2014/main" id="{8BE6ABE3-7B91-4B18-9054-3AB955392BE6}"/>
+              </a:ext>
+            </a:extLst>
+          </p:cNvPr>
+          <p:cNvSpPr>
+            <a:spLocks noGrp="1"/>
+          </p:cNvSpPr>
+          <p:nvPr>
+            <p:ph type="title" orient="vert"/>
+          </p:nvPr>
+        </p:nvSpPr>
+        <p:spPr>
+          <a:xfrm>
+            <a:off x="8724900" y="365125"/>
+            <a:ext cx="2628900" cy="5811838"/>
+          </a:xfrm>
+        </p:spPr>
+        <p:txBody>
+          <a:bodyPr vert="eaVert"/>
+          <a:lstStyle/>
+          <a:p>
+            <a:r>
+              <a:rPr lang="en-US"/>
+              <a:t>Click to edit Master title style</a:t>
+            </a:r>
+            <a:endParaRPr lang="en-CH"/>
+          </a:p>
+        </p:txBody>
+      </p:sp>
+      <p:sp>
+        <p:nvSpPr>
+          <p:cNvPr id="3" name="Vertical Text Placeholder 2">
+            <a:extLst>
+              <a:ext uri="{FF2B5EF4-FFF2-40B4-BE49-F238E27FC236}">
+                <a16:creationId xmlns:a16="http://schemas.microsoft.com/office/drawing/2014/main" id="{BA633229-C1D4-4863-94F9-7A5887AA9F35}"/>
+              </a:ext>
+            </a:extLst>
+          </p:cNvPr>
+          <p:cNvSpPr>
+            <a:spLocks noGrp="1"/>
+          </p:cNvSpPr>
+          <p:nvPr>
+            <p:ph type="body" orient="vert" idx="1"/>
+          </p:nvPr>
+        </p:nvSpPr>
+        <p:spPr>
+          <a:xfrm>
+            <a:off x="838200" y="365125"/>
+            <a:ext cx="7734300" cy="5811838"/>
+          </a:xfrm>
+        </p:spPr>
+        <p:txBody>
+          <a:bodyPr vert="eaVert"/>
+          <a:lstStyle/>
+          <a:p>
+            <a:pPr lvl="0"/>
+            <a:r>
+              <a:rPr lang="en-US"/>
+              <a:t>Click to edit Master text styles</a:t>
+            </a:r>
+          </a:p>
+          <a:p>
+            <a:pPr lvl="1"/>
+            <a:r>
+              <a:rPr lang="en-US"/>
+              <a:t>Second level</a:t>
+            </a:r>
+          </a:p>
+          <a:p>
+            <a:pPr lvl="2"/>
+            <a:r>
+              <a:rPr lang="en-US"/>
+              <a:t>Third level</a:t>
+            </a:r>
+          </a:p>
+          <a:p>
+            <a:pPr lvl="3"/>
+            <a:r>
+              <a:rPr lang="en-US"/>
+              <a:t>Fourth level</a:t>
+            </a:r>
+          </a:p>
+          <a:p>
+            <a:pPr lvl="4"/>
+            <a:r>
+              <a:rPr lang="en-US"/>
+              <a:t>Fifth level</a:t>
+            </a:r>
+            <a:endParaRPr lang="en-CH"/>
+          </a:p>
+        </p:txBody>
+      </p:sp>
+      <p:sp>
+        <p:nvSpPr>
+          <p:cNvPr id="4" name="Date Placeholder 3">
+            <a:extLst>
+              <a:ext uri="{FF2B5EF4-FFF2-40B4-BE49-F238E27FC236}">
+                <a16:creationId xmlns:a16="http://schemas.microsoft.com/office/drawing/2014/main" id="{C81DC4A7-AB1C-4309-A640-6B71DE02807C}"/>
+              </a:ext>
+            </a:extLst>
+          </p:cNvPr>
+          <p:cNvSpPr>
+            <a:spLocks noGrp="1"/>
+          </p:cNvSpPr>
+          <p:nvPr>
+            <p:ph type="dt" sz="half" idx="10"/>
+          </p:nvPr>
+        </p:nvSpPr>
+        <p:spPr>
+          <a:xfrm>
+            <a:off x="838200" y="6356350"/>
+            <a:ext cx="2743200" cy="365125"/>
+          </a:xfrm>
+          <a:prstGeom prst="rect">
+            <a:avLst/>
+          </a:prstGeom>
+        </p:spPr>
+        <p:txBody>
+          <a:bodyPr/>
+          <a:lstStyle/>
+          <a:p>
+            <a:fld id="{0B674421-677E-4B66-A2DA-A5AC43FD4FB9}" type="datetimeFigureOut">
+              <a:rPr lang="en-CH" smtClean="0"/>
+              <a:t>09/16/2022</a:t>
+            </a:fld>
+            <a:endParaRPr lang="en-CH"/>
+          </a:p>
+        </p:txBody>
+      </p:sp>
+      <p:sp>
+        <p:nvSpPr>
+          <p:cNvPr id="5" name="Footer Placeholder 4">
+            <a:extLst>
+              <a:ext uri="{FF2B5EF4-FFF2-40B4-BE49-F238E27FC236}">
+                <a16:creationId xmlns:a16="http://schemas.microsoft.com/office/drawing/2014/main" id="{605DA4FB-D5B2-4A26-993D-C30CB526069F}"/>
+              </a:ext>
+            </a:extLst>
+          </p:cNvPr>
+          <p:cNvSpPr>
+            <a:spLocks noGrp="1"/>
+          </p:cNvSpPr>
+          <p:nvPr>
+            <p:ph type="ftr" sz="quarter" idx="11"/>
+          </p:nvPr>
+        </p:nvSpPr>
+        <p:spPr>
+          <a:xfrm>
+            <a:off x="4038600" y="6356350"/>
+            <a:ext cx="4114800" cy="365125"/>
+          </a:xfrm>
+          <a:prstGeom prst="rect">
+            <a:avLst/>
+          </a:prstGeom>
+        </p:spPr>
+        <p:txBody>
+          <a:bodyPr/>
+          <a:lstStyle/>
+          <a:p>
+            <a:endParaRPr lang="en-CH"/>
+          </a:p>
+        </p:txBody>
+      </p:sp>
+      <p:sp>
+        <p:nvSpPr>
+          <p:cNvPr id="6" name="Slide Number Placeholder 5">
+            <a:extLst>
+              <a:ext uri="{FF2B5EF4-FFF2-40B4-BE49-F238E27FC236}">
+                <a16:creationId xmlns:a16="http://schemas.microsoft.com/office/drawing/2014/main" id="{E18F2833-2585-4DDD-A44D-34D54F6ADDBE}"/>
+              </a:ext>
+            </a:extLst>
+          </p:cNvPr>
+          <p:cNvSpPr>
+            <a:spLocks noGrp="1"/>
+          </p:cNvSpPr>
+          <p:nvPr>
+            <p:ph type="sldNum" sz="quarter" idx="12"/>
+          </p:nvPr>
+        </p:nvSpPr>
+        <p:spPr>
+          <a:xfrm>
+            <a:off x="8610600" y="6356350"/>
+            <a:ext cx="2743200" cy="365125"/>
+          </a:xfrm>
+          <a:prstGeom prst="rect">
+            <a:avLst/>
+          </a:prstGeom>
+        </p:spPr>
+        <p:txBody>
+          <a:bodyPr/>
+          <a:lstStyle/>
+          <a:p>
+            <a:fld id="{684DE7A4-2B7A-433D-B62F-90D0DFA526E2}" type="slidenum">
+              <a:rPr lang="en-CH" smtClean="0"/>
+              <a:t>‹#›</a:t>
+            </a:fld>
+            <a:endParaRPr lang="en-CH"/>
+          </a:p>
+        </p:txBody>
+      </p:sp>
+    </p:spTree>
+    <p:extLst>
+      <p:ext uri="{BB962C8B-B14F-4D97-AF65-F5344CB8AC3E}">
+        <p14:creationId xmlns:p14="http://schemas.microsoft.com/office/powerpoint/2010/main" val="3848949333"/>
       </p:ext>
     </p:extLst>
   </p:cSld>
@@ -1401,6 +1635,216 @@
 </file>
 
 <file path=ppt/slideLayouts/slideLayout8.xml><?xml version="1.0" encoding="utf-8"?>
+<p:sldLayout xmlns:a="http://schemas.openxmlformats.org/drawingml/2006/main" xmlns:r="http://schemas.openxmlformats.org/officeDocument/2006/relationships" xmlns:p="http://schemas.openxmlformats.org/presentationml/2006/main" type="objTx" preserve="1">
+  <p:cSld name="Content with Caption">
+    <p:spTree>
+      <p:nvGrpSpPr>
+        <p:cNvPr id="1" name=""/>
+        <p:cNvGrpSpPr/>
+        <p:nvPr/>
+      </p:nvGrpSpPr>
+      <p:grpSpPr>
+        <a:xfrm>
+          <a:off x="0" y="0"/>
+          <a:ext cx="0" cy="0"/>
+          <a:chOff x="0" y="0"/>
+          <a:chExt cx="0" cy="0"/>
+        </a:xfrm>
+      </p:grpSpPr>
+      <p:sp>
+        <p:nvSpPr>
+          <p:cNvPr id="2" name="Title 1"/>
+          <p:cNvSpPr>
+            <a:spLocks noGrp="1"/>
+          </p:cNvSpPr>
+          <p:nvPr>
+            <p:ph type="title"/>
+          </p:nvPr>
+        </p:nvSpPr>
+        <p:spPr>
+          <a:xfrm>
+            <a:off x="609602" y="273049"/>
+            <a:ext cx="4011084" cy="1162051"/>
+          </a:xfrm>
+        </p:spPr>
+        <p:txBody>
+          <a:bodyPr anchor="b"/>
+          <a:lstStyle>
+            <a:lvl1pPr algn="l">
+              <a:defRPr sz="2000" b="1"/>
+            </a:lvl1pPr>
+          </a:lstStyle>
+          <a:p>
+            <a:r>
+              <a:rPr lang="en-US" dirty="0"/>
+              <a:t>Click to edit Master title style</a:t>
+            </a:r>
+          </a:p>
+        </p:txBody>
+      </p:sp>
+      <p:sp>
+        <p:nvSpPr>
+          <p:cNvPr id="3" name="Content Placeholder 2"/>
+          <p:cNvSpPr>
+            <a:spLocks noGrp="1"/>
+          </p:cNvSpPr>
+          <p:nvPr>
+            <p:ph idx="1"/>
+          </p:nvPr>
+        </p:nvSpPr>
+        <p:spPr>
+          <a:xfrm>
+            <a:off x="4766733" y="273052"/>
+            <a:ext cx="6815667" cy="5562483"/>
+          </a:xfrm>
+        </p:spPr>
+        <p:txBody>
+          <a:bodyPr/>
+          <a:lstStyle>
+            <a:lvl1pPr>
+              <a:defRPr sz="3200"/>
+            </a:lvl1pPr>
+            <a:lvl2pPr>
+              <a:defRPr sz="2800"/>
+            </a:lvl2pPr>
+            <a:lvl3pPr>
+              <a:defRPr sz="2400"/>
+            </a:lvl3pPr>
+            <a:lvl4pPr>
+              <a:defRPr sz="2000"/>
+            </a:lvl4pPr>
+            <a:lvl5pPr>
+              <a:defRPr sz="2000"/>
+            </a:lvl5pPr>
+            <a:lvl6pPr>
+              <a:defRPr sz="2000"/>
+            </a:lvl6pPr>
+            <a:lvl7pPr>
+              <a:defRPr sz="2000"/>
+            </a:lvl7pPr>
+            <a:lvl8pPr>
+              <a:defRPr sz="2000"/>
+            </a:lvl8pPr>
+            <a:lvl9pPr>
+              <a:defRPr sz="2000"/>
+            </a:lvl9pPr>
+          </a:lstStyle>
+          <a:p>
+            <a:pPr lvl="0"/>
+            <a:r>
+              <a:rPr lang="en-US"/>
+              <a:t>Click to edit Master text styles</a:t>
+            </a:r>
+          </a:p>
+          <a:p>
+            <a:pPr lvl="1"/>
+            <a:r>
+              <a:rPr lang="en-US"/>
+              <a:t>Second level</a:t>
+            </a:r>
+          </a:p>
+          <a:p>
+            <a:pPr lvl="2"/>
+            <a:r>
+              <a:rPr lang="en-US"/>
+              <a:t>Third level</a:t>
+            </a:r>
+          </a:p>
+          <a:p>
+            <a:pPr lvl="3"/>
+            <a:r>
+              <a:rPr lang="en-US"/>
+              <a:t>Fourth level</a:t>
+            </a:r>
+          </a:p>
+          <a:p>
+            <a:pPr lvl="4"/>
+            <a:r>
+              <a:rPr lang="en-US"/>
+              <a:t>Fifth level</a:t>
+            </a:r>
+          </a:p>
+        </p:txBody>
+      </p:sp>
+      <p:sp>
+        <p:nvSpPr>
+          <p:cNvPr id="4" name="Text Placeholder 3"/>
+          <p:cNvSpPr>
+            <a:spLocks noGrp="1"/>
+          </p:cNvSpPr>
+          <p:nvPr>
+            <p:ph type="body" sz="half" idx="2"/>
+          </p:nvPr>
+        </p:nvSpPr>
+        <p:spPr>
+          <a:xfrm>
+            <a:off x="609602" y="1571105"/>
+            <a:ext cx="4011084" cy="4264430"/>
+          </a:xfrm>
+        </p:spPr>
+        <p:txBody>
+          <a:bodyPr/>
+          <a:lstStyle>
+            <a:lvl1pPr marL="0" indent="0">
+              <a:buNone/>
+              <a:defRPr sz="1400"/>
+            </a:lvl1pPr>
+            <a:lvl2pPr marL="457189" indent="0">
+              <a:buNone/>
+              <a:defRPr sz="1200"/>
+            </a:lvl2pPr>
+            <a:lvl3pPr marL="914377" indent="0">
+              <a:buNone/>
+              <a:defRPr sz="1000"/>
+            </a:lvl3pPr>
+            <a:lvl4pPr marL="1371566" indent="0">
+              <a:buNone/>
+              <a:defRPr sz="900"/>
+            </a:lvl4pPr>
+            <a:lvl5pPr marL="1828754" indent="0">
+              <a:buNone/>
+              <a:defRPr sz="900"/>
+            </a:lvl5pPr>
+            <a:lvl6pPr marL="2285943" indent="0">
+              <a:buNone/>
+              <a:defRPr sz="900"/>
+            </a:lvl6pPr>
+            <a:lvl7pPr marL="2743131" indent="0">
+              <a:buNone/>
+              <a:defRPr sz="900"/>
+            </a:lvl7pPr>
+            <a:lvl8pPr marL="3200320" indent="0">
+              <a:buNone/>
+              <a:defRPr sz="900"/>
+            </a:lvl8pPr>
+            <a:lvl9pPr marL="3657509" indent="0">
+              <a:buNone/>
+              <a:defRPr sz="900"/>
+            </a:lvl9pPr>
+          </a:lstStyle>
+          <a:p>
+            <a:pPr lvl="0"/>
+            <a:r>
+              <a:rPr lang="en-US"/>
+              <a:t>Click to edit Master text styles</a:t>
+            </a:r>
+          </a:p>
+        </p:txBody>
+      </p:sp>
+    </p:spTree>
+    <p:extLst>
+      <p:ext uri="{BB962C8B-B14F-4D97-AF65-F5344CB8AC3E}">
+        <p14:creationId xmlns:p14="http://schemas.microsoft.com/office/powerpoint/2010/main" val="3777487976"/>
+      </p:ext>
+    </p:extLst>
+  </p:cSld>
+  <p:clrMapOvr>
+    <a:masterClrMapping/>
+  </p:clrMapOvr>
+</p:sldLayout>
+</file>
+
+<file path=ppt/slideLayouts/slideLayout9.xml><?xml version="1.0" encoding="utf-8"?>
 <p:sldLayout xmlns:a="http://schemas.openxmlformats.org/drawingml/2006/main" xmlns:r="http://schemas.openxmlformats.org/officeDocument/2006/relationships" xmlns:p="http://schemas.openxmlformats.org/presentationml/2006/main" type="vertTx" preserve="1">
   <p:cSld name="Title and Vertical Text">
     <p:spTree>
@@ -1535,7 +1979,7 @@
           <a:p>
             <a:fld id="{0B674421-677E-4B66-A2DA-A5AC43FD4FB9}" type="datetimeFigureOut">
               <a:rPr lang="en-CH" smtClean="0"/>
-              <a:t>09/15/2022</a:t>
+              <a:t>09/16/2022</a:t>
             </a:fld>
             <a:endParaRPr lang="en-CH"/>
           </a:p>
@@ -1615,240 +2059,6 @@
     <p:extLst>
       <p:ext uri="{BB962C8B-B14F-4D97-AF65-F5344CB8AC3E}">
         <p14:creationId xmlns:p14="http://schemas.microsoft.com/office/powerpoint/2010/main" val="363492398"/>
-      </p:ext>
-    </p:extLst>
-  </p:cSld>
-  <p:clrMapOvr>
-    <a:masterClrMapping/>
-  </p:clrMapOvr>
-</p:sldLayout>
-</file>
-
-<file path=ppt/slideLayouts/slideLayout9.xml><?xml version="1.0" encoding="utf-8"?>
-<p:sldLayout xmlns:a="http://schemas.openxmlformats.org/drawingml/2006/main" xmlns:r="http://schemas.openxmlformats.org/officeDocument/2006/relationships" xmlns:p="http://schemas.openxmlformats.org/presentationml/2006/main" type="vertTitleAndTx" preserve="1">
-  <p:cSld name="Vertical Title and Text">
-    <p:spTree>
-      <p:nvGrpSpPr>
-        <p:cNvPr id="1" name=""/>
-        <p:cNvGrpSpPr/>
-        <p:nvPr/>
-      </p:nvGrpSpPr>
-      <p:grpSpPr>
-        <a:xfrm>
-          <a:off x="0" y="0"/>
-          <a:ext cx="0" cy="0"/>
-          <a:chOff x="0" y="0"/>
-          <a:chExt cx="0" cy="0"/>
-        </a:xfrm>
-      </p:grpSpPr>
-      <p:sp>
-        <p:nvSpPr>
-          <p:cNvPr id="2" name="Vertical Title 1">
-            <a:extLst>
-              <a:ext uri="{FF2B5EF4-FFF2-40B4-BE49-F238E27FC236}">
-                <a16:creationId xmlns:a16="http://schemas.microsoft.com/office/drawing/2014/main" id="{8BE6ABE3-7B91-4B18-9054-3AB955392BE6}"/>
-              </a:ext>
-            </a:extLst>
-          </p:cNvPr>
-          <p:cNvSpPr>
-            <a:spLocks noGrp="1"/>
-          </p:cNvSpPr>
-          <p:nvPr>
-            <p:ph type="title" orient="vert"/>
-          </p:nvPr>
-        </p:nvSpPr>
-        <p:spPr>
-          <a:xfrm>
-            <a:off x="8724900" y="365125"/>
-            <a:ext cx="2628900" cy="5811838"/>
-          </a:xfrm>
-        </p:spPr>
-        <p:txBody>
-          <a:bodyPr vert="eaVert"/>
-          <a:lstStyle/>
-          <a:p>
-            <a:r>
-              <a:rPr lang="en-US"/>
-              <a:t>Click to edit Master title style</a:t>
-            </a:r>
-            <a:endParaRPr lang="en-CH"/>
-          </a:p>
-        </p:txBody>
-      </p:sp>
-      <p:sp>
-        <p:nvSpPr>
-          <p:cNvPr id="3" name="Vertical Text Placeholder 2">
-            <a:extLst>
-              <a:ext uri="{FF2B5EF4-FFF2-40B4-BE49-F238E27FC236}">
-                <a16:creationId xmlns:a16="http://schemas.microsoft.com/office/drawing/2014/main" id="{BA633229-C1D4-4863-94F9-7A5887AA9F35}"/>
-              </a:ext>
-            </a:extLst>
-          </p:cNvPr>
-          <p:cNvSpPr>
-            <a:spLocks noGrp="1"/>
-          </p:cNvSpPr>
-          <p:nvPr>
-            <p:ph type="body" orient="vert" idx="1"/>
-          </p:nvPr>
-        </p:nvSpPr>
-        <p:spPr>
-          <a:xfrm>
-            <a:off x="838200" y="365125"/>
-            <a:ext cx="7734300" cy="5811838"/>
-          </a:xfrm>
-        </p:spPr>
-        <p:txBody>
-          <a:bodyPr vert="eaVert"/>
-          <a:lstStyle/>
-          <a:p>
-            <a:pPr lvl="0"/>
-            <a:r>
-              <a:rPr lang="en-US"/>
-              <a:t>Click to edit Master text styles</a:t>
-            </a:r>
-          </a:p>
-          <a:p>
-            <a:pPr lvl="1"/>
-            <a:r>
-              <a:rPr lang="en-US"/>
-              <a:t>Second level</a:t>
-            </a:r>
-          </a:p>
-          <a:p>
-            <a:pPr lvl="2"/>
-            <a:r>
-              <a:rPr lang="en-US"/>
-              <a:t>Third level</a:t>
-            </a:r>
-          </a:p>
-          <a:p>
-            <a:pPr lvl="3"/>
-            <a:r>
-              <a:rPr lang="en-US"/>
-              <a:t>Fourth level</a:t>
-            </a:r>
-          </a:p>
-          <a:p>
-            <a:pPr lvl="4"/>
-            <a:r>
-              <a:rPr lang="en-US"/>
-              <a:t>Fifth level</a:t>
-            </a:r>
-            <a:endParaRPr lang="en-CH"/>
-          </a:p>
-        </p:txBody>
-      </p:sp>
-      <p:sp>
-        <p:nvSpPr>
-          <p:cNvPr id="4" name="Date Placeholder 3">
-            <a:extLst>
-              <a:ext uri="{FF2B5EF4-FFF2-40B4-BE49-F238E27FC236}">
-                <a16:creationId xmlns:a16="http://schemas.microsoft.com/office/drawing/2014/main" id="{C81DC4A7-AB1C-4309-A640-6B71DE02807C}"/>
-              </a:ext>
-            </a:extLst>
-          </p:cNvPr>
-          <p:cNvSpPr>
-            <a:spLocks noGrp="1"/>
-          </p:cNvSpPr>
-          <p:nvPr>
-            <p:ph type="dt" sz="half" idx="10"/>
-          </p:nvPr>
-        </p:nvSpPr>
-        <p:spPr>
-          <a:xfrm>
-            <a:off x="838200" y="6356350"/>
-            <a:ext cx="2743200" cy="365125"/>
-          </a:xfrm>
-          <a:prstGeom prst="rect">
-            <a:avLst/>
-          </a:prstGeom>
-        </p:spPr>
-        <p:txBody>
-          <a:bodyPr/>
-          <a:lstStyle/>
-          <a:p>
-            <a:fld id="{0B674421-677E-4B66-A2DA-A5AC43FD4FB9}" type="datetimeFigureOut">
-              <a:rPr lang="en-CH" smtClean="0"/>
-              <a:t>09/15/2022</a:t>
-            </a:fld>
-            <a:endParaRPr lang="en-CH"/>
-          </a:p>
-        </p:txBody>
-      </p:sp>
-      <p:sp>
-        <p:nvSpPr>
-          <p:cNvPr id="5" name="Footer Placeholder 4">
-            <a:extLst>
-              <a:ext uri="{FF2B5EF4-FFF2-40B4-BE49-F238E27FC236}">
-                <a16:creationId xmlns:a16="http://schemas.microsoft.com/office/drawing/2014/main" id="{605DA4FB-D5B2-4A26-993D-C30CB526069F}"/>
-              </a:ext>
-            </a:extLst>
-          </p:cNvPr>
-          <p:cNvSpPr>
-            <a:spLocks noGrp="1"/>
-          </p:cNvSpPr>
-          <p:nvPr>
-            <p:ph type="ftr" sz="quarter" idx="11"/>
-          </p:nvPr>
-        </p:nvSpPr>
-        <p:spPr>
-          <a:xfrm>
-            <a:off x="4038600" y="6356350"/>
-            <a:ext cx="4114800" cy="365125"/>
-          </a:xfrm>
-          <a:prstGeom prst="rect">
-            <a:avLst/>
-          </a:prstGeom>
-        </p:spPr>
-        <p:txBody>
-          <a:bodyPr/>
-          <a:lstStyle/>
-          <a:p>
-            <a:endParaRPr lang="en-CH"/>
-          </a:p>
-        </p:txBody>
-      </p:sp>
-      <p:sp>
-        <p:nvSpPr>
-          <p:cNvPr id="6" name="Slide Number Placeholder 5">
-            <a:extLst>
-              <a:ext uri="{FF2B5EF4-FFF2-40B4-BE49-F238E27FC236}">
-                <a16:creationId xmlns:a16="http://schemas.microsoft.com/office/drawing/2014/main" id="{E18F2833-2585-4DDD-A44D-34D54F6ADDBE}"/>
-              </a:ext>
-            </a:extLst>
-          </p:cNvPr>
-          <p:cNvSpPr>
-            <a:spLocks noGrp="1"/>
-          </p:cNvSpPr>
-          <p:nvPr>
-            <p:ph type="sldNum" sz="quarter" idx="12"/>
-          </p:nvPr>
-        </p:nvSpPr>
-        <p:spPr>
-          <a:xfrm>
-            <a:off x="8610600" y="6356350"/>
-            <a:ext cx="2743200" cy="365125"/>
-          </a:xfrm>
-          <a:prstGeom prst="rect">
-            <a:avLst/>
-          </a:prstGeom>
-        </p:spPr>
-        <p:txBody>
-          <a:bodyPr/>
-          <a:lstStyle/>
-          <a:p>
-            <a:fld id="{684DE7A4-2B7A-433D-B62F-90D0DFA526E2}" type="slidenum">
-              <a:rPr lang="en-CH" smtClean="0"/>
-              <a:t>‹#›</a:t>
-            </a:fld>
-            <a:endParaRPr lang="en-CH"/>
-          </a:p>
-        </p:txBody>
-      </p:sp>
-    </p:spTree>
-    <p:extLst>
-      <p:ext uri="{BB962C8B-B14F-4D97-AF65-F5344CB8AC3E}">
-        <p14:creationId xmlns:p14="http://schemas.microsoft.com/office/powerpoint/2010/main" val="3848949333"/>
       </p:ext>
     </p:extLst>
   </p:cSld>
@@ -2002,13 +2212,13 @@
           <p:nvPr userDrawn="1"/>
         </p:nvPicPr>
         <p:blipFill>
-          <a:blip r:embed="rId11">
+          <a:blip r:embed="rId12">
             <a:extLst>
               <a:ext uri="{28A0092B-C50C-407E-A947-70E740481C1C}">
                 <a14:useLocalDpi xmlns:a14="http://schemas.microsoft.com/office/drawing/2010/main" val="0"/>
               </a:ext>
               <a:ext uri="{96DAC541-7B7A-43D3-8B79-37D633B846F1}">
-                <asvg:svgBlip xmlns:asvg="http://schemas.microsoft.com/office/drawing/2016/SVG/main" r:embed="rId12"/>
+                <asvg:svgBlip xmlns:asvg="http://schemas.microsoft.com/office/drawing/2016/SVG/main" r:embed="rId13"/>
               </a:ext>
             </a:extLst>
           </a:blip>
@@ -2083,8 +2293,9 @@
     <p:sldLayoutId id="2147483653" r:id="rId5"/>
     <p:sldLayoutId id="2147483654" r:id="rId6"/>
     <p:sldLayoutId id="2147483655" r:id="rId7"/>
-    <p:sldLayoutId id="2147483658" r:id="rId8"/>
-    <p:sldLayoutId id="2147483659" r:id="rId9"/>
+    <p:sldLayoutId id="2147483660" r:id="rId8"/>
+    <p:sldLayoutId id="2147483658" r:id="rId9"/>
+    <p:sldLayoutId id="2147483659" r:id="rId10"/>
   </p:sldLayoutIdLst>
   <p:txStyles>
     <p:titleStyle>

</xml_diff>